<commit_message>
Modified the project description
</commit_message>
<xml_diff>
--- a/Artificial Intelligence/Pattern Recognition with OpenCV/Pattern Recognition Process.pptx
+++ b/Artificial Intelligence/Pattern Recognition with OpenCV/Pattern Recognition Process.pptx
@@ -12420,7 +12420,7 @@
               <a:buAutoNum type="alphaLcPeriod"/>
             </a:pPr>
             <a:r>
-              <a:rPr lang="en" sz="1200" dirty="0">
+              <a:rPr lang="en-US" sz="1200" dirty="0">
                 <a:solidFill>
                   <a:srgbClr val="444654"/>
                 </a:solidFill>
@@ -12428,16 +12428,8 @@
                   <a:schemeClr val="lt1"/>
                 </a:highlight>
               </a:rPr>
-              <a:t>Noise Reduction</a:t>
-            </a:r>
-            <a:endParaRPr sz="1200" dirty="0">
-              <a:solidFill>
-                <a:srgbClr val="444654"/>
-              </a:solidFill>
-              <a:highlight>
-                <a:schemeClr val="lt1"/>
-              </a:highlight>
-            </a:endParaRPr>
+              <a:t>Noise Reduction by using Gaussian Filter</a:t>
+            </a:r>
           </a:p>
           <a:p>
             <a:pPr marL="914400" lvl="1" indent="-304800" algn="l" rtl="0">
@@ -12874,7 +12866,15 @@
             </a:pPr>
             <a:r>
               <a:rPr lang="en" dirty="0"/>
-              <a:t>This technical report outlines the process of pattern recognition using image processing techniques. The main goal of this process is to distinguish and classify objects within an image. The report covers the design and implementation of key steps involved in the pattern recognition process, including noise reduction, histogram analysis, thresholding, connectivity analysis, and pattern recognition itself.</a:t>
+              <a:t>This technical report outlines the process of pattern recognition using image processing techniques. The main goal of this process is </a:t>
+            </a:r>
+            <a:r>
+              <a:rPr lang="en-US" dirty="0"/>
+              <a:t>to remove salt and pepper noises within an image by using the OpenCV library and do JPG image convolution with Gaussian Filter</a:t>
+            </a:r>
+            <a:r>
+              <a:rPr lang="en" dirty="0"/>
+              <a:t>.</a:t>
             </a:r>
             <a:endParaRPr dirty="0"/>
           </a:p>
@@ -12983,7 +12983,7 @@
             </a:pPr>
             <a:r>
               <a:rPr lang="en-US" sz="1800" b="1" dirty="0"/>
-              <a:t>Noise Reduction by Blurring</a:t>
+              <a:t>Noise Reduction by using Gaussian Filter</a:t>
             </a:r>
           </a:p>
           <a:p>
@@ -13001,7 +13001,7 @@
             </a:pPr>
             <a:r>
               <a:rPr lang="en-US" dirty="0"/>
-              <a:t>Noise reduction through blurring is performed to enhance the distinction between object edges in the image. Moreover, The noise reduction step aims to improve the subsequent stages of the pattern recognition process.</a:t>
+              <a:t>Noise reduction by using Gaussian Filter is performed to remove salt and pepper. The technique provides a basic outline of how to use OpenCV to perform image convolution with a Gaussian filter to remove salt and pepper noise.</a:t>
             </a:r>
             <a:endParaRPr dirty="0"/>
           </a:p>

</xml_diff>